<commit_message>
Made edges shorter slightly
</commit_message>
<xml_diff>
--- a/figures/figures.pptx
+++ b/figures/figures.pptx
@@ -2919,8 +2919,8 @@
     <dgm:cxn modelId="{69B993C8-5B5B-004A-A7B6-43B70044203E}" type="presOf" srcId="{533BC168-BC76-C14E-8694-1DC3B6CF54C5}" destId="{A8C226CF-C78B-EB4E-86A6-1B0387CFF648}" srcOrd="1" destOrd="0" presId="urn:microsoft.com/office/officeart/2005/8/layout/process1"/>
     <dgm:cxn modelId="{DE807855-9CDD-324C-81D4-3B87064B6B29}" srcId="{DE49E2BA-261B-EC46-BAF7-6B78BDB6F06F}" destId="{5251FC95-52A4-DA43-90C4-BEF4D9B3E10E}" srcOrd="3" destOrd="0" parTransId="{B584EBF7-2A7D-E045-BCC4-FE73521BF4F3}" sibTransId="{3C854AC4-90AA-854D-BFF7-6114E9ACB01C}"/>
     <dgm:cxn modelId="{F550F3EB-D554-514D-9172-65DAE540D191}" srcId="{DE49E2BA-261B-EC46-BAF7-6B78BDB6F06F}" destId="{D8DAD879-37C7-774C-B149-B7250DD6D502}" srcOrd="2" destOrd="0" parTransId="{3057D897-29F9-DD49-B58A-81904BB7F42F}" sibTransId="{FA861C74-A4AA-6341-A5A4-19F33298102E}"/>
+    <dgm:cxn modelId="{7655A7DE-AEF1-CB45-8E72-38EE0E407EEC}" type="presOf" srcId="{801AFE1A-416D-E74C-BBFD-557415AE0194}" destId="{C5062774-D3A7-8B40-8FDE-995EBC7DED98}" srcOrd="0" destOrd="0" presId="urn:microsoft.com/office/officeart/2005/8/layout/process1"/>
     <dgm:cxn modelId="{B100615C-4220-A446-A9F1-54FE4617F2CA}" type="presOf" srcId="{5EDB0D77-09F0-0C4F-B332-E852A176F79A}" destId="{E324EA71-C9AB-2943-812E-646AB1B31125}" srcOrd="0" destOrd="0" presId="urn:microsoft.com/office/officeart/2005/8/layout/process1"/>
-    <dgm:cxn modelId="{7655A7DE-AEF1-CB45-8E72-38EE0E407EEC}" type="presOf" srcId="{801AFE1A-416D-E74C-BBFD-557415AE0194}" destId="{C5062774-D3A7-8B40-8FDE-995EBC7DED98}" srcOrd="0" destOrd="0" presId="urn:microsoft.com/office/officeart/2005/8/layout/process1"/>
     <dgm:cxn modelId="{2F6EDDF8-1A52-CA4F-AC56-E7B813883AFC}" srcId="{DE49E2BA-261B-EC46-BAF7-6B78BDB6F06F}" destId="{5EDB0D77-09F0-0C4F-B332-E852A176F79A}" srcOrd="0" destOrd="0" parTransId="{6905B776-7DF3-2743-A7A0-DC627995A528}" sibTransId="{486F902B-586B-8044-9F9C-0B0AEA8029F9}"/>
     <dgm:cxn modelId="{B257B745-A9CD-6147-A01C-9AFE37BAEB28}" type="presOf" srcId="{FA861C74-A4AA-6341-A5A4-19F33298102E}" destId="{80A3280C-1FE1-F741-8E7B-2B8CCCBB28E5}" srcOrd="1" destOrd="0" presId="urn:microsoft.com/office/officeart/2005/8/layout/process1"/>
     <dgm:cxn modelId="{7F1C225A-91D9-C84E-ABEC-B09A4605E406}" type="presOf" srcId="{486F902B-586B-8044-9F9C-0B0AEA8029F9}" destId="{93205773-7419-ED4D-91F8-2A24298BF005}" srcOrd="1" destOrd="0" presId="urn:microsoft.com/office/officeart/2005/8/layout/process1"/>
@@ -17008,7 +17008,7 @@
         </p:nvSpPr>
         <p:spPr>
           <a:xfrm>
-            <a:off x="4540629" y="5193962"/>
+            <a:off x="4540629" y="4662324"/>
             <a:ext cx="1271751" cy="1271751"/>
           </a:xfrm>
           <a:prstGeom prst="ellipse">
@@ -17066,7 +17066,7 @@
         </p:nvSpPr>
         <p:spPr>
           <a:xfrm>
-            <a:off x="6983658" y="5193961"/>
+            <a:off x="6983658" y="4662323"/>
             <a:ext cx="1271751" cy="1271751"/>
           </a:xfrm>
           <a:prstGeom prst="ellipse">
@@ -17127,7 +17127,7 @@
         </p:nvCxnSpPr>
         <p:spPr>
           <a:xfrm flipV="1">
-            <a:off x="5812380" y="5829837"/>
+            <a:off x="5812380" y="5298199"/>
             <a:ext cx="1171278" cy="1"/>
           </a:xfrm>
           <a:prstGeom prst="straightConnector1">
@@ -17167,7 +17167,7 @@
         <p:spPr>
           <a:xfrm>
             <a:off x="4726873" y="3946163"/>
-            <a:ext cx="0" cy="1434043"/>
+            <a:ext cx="0" cy="902405"/>
           </a:xfrm>
           <a:prstGeom prst="straightConnector1">
             <a:avLst/>
@@ -17206,7 +17206,7 @@
         <p:spPr>
           <a:xfrm>
             <a:off x="7169902" y="3946162"/>
-            <a:ext cx="0" cy="1434043"/>
+            <a:ext cx="0" cy="902405"/>
           </a:xfrm>
           <a:prstGeom prst="straightConnector1">
             <a:avLst/>
@@ -17245,7 +17245,7 @@
         <p:spPr>
           <a:xfrm flipV="1">
             <a:off x="5626136" y="3946163"/>
-            <a:ext cx="0" cy="1434043"/>
+            <a:ext cx="0" cy="902405"/>
           </a:xfrm>
           <a:prstGeom prst="straightConnector1">
             <a:avLst/>
@@ -17284,7 +17284,7 @@
         <p:spPr>
           <a:xfrm flipV="1">
             <a:off x="8069165" y="3946162"/>
-            <a:ext cx="0" cy="1434043"/>
+            <a:ext cx="0" cy="902405"/>
           </a:xfrm>
           <a:prstGeom prst="straightConnector1">
             <a:avLst/>
@@ -17335,6 +17335,7 @@
               </a:bodyPr>
               <a:lstStyle/>
               <a:p>
+                <a:pPr/>
                 <a14:m>
                   <m:oMathPara xmlns:m="http://schemas.openxmlformats.org/officeDocument/2006/math">
                     <m:oMathParaPr>
@@ -17702,7 +17703,7 @@
             </p:nvSpPr>
             <p:spPr>
               <a:xfrm>
-                <a:off x="4082371" y="4451485"/>
+                <a:off x="4082371" y="4217563"/>
                 <a:ext cx="612222" cy="307777"/>
               </a:xfrm>
               <a:prstGeom prst="rect">
@@ -17716,6 +17717,7 @@
               </a:bodyPr>
               <a:lstStyle/>
               <a:p>
+                <a:pPr/>
                 <a14:m>
                   <m:oMathPara xmlns:m="http://schemas.openxmlformats.org/officeDocument/2006/math">
                     <m:oMathParaPr>
@@ -17778,7 +17780,7 @@
             </p:nvSpPr>
             <p:spPr>
               <a:xfrm>
-                <a:off x="4082371" y="4451485"/>
+                <a:off x="4082371" y="4217563"/>
                 <a:ext cx="612222" cy="307777"/>
               </a:xfrm>
               <a:prstGeom prst="rect">
@@ -17787,7 +17789,7 @@
               <a:blipFill rotWithShape="0">
                 <a:blip r:embed="rId3"/>
                 <a:stretch>
-                  <a:fillRect l="-11000" r="-4000" b="-15686"/>
+                  <a:fillRect l="-11000" r="-4000" b="-16000"/>
                 </a:stretch>
               </a:blipFill>
             </p:spPr>
@@ -17816,7 +17818,7 @@
             </p:nvSpPr>
             <p:spPr>
               <a:xfrm>
-                <a:off x="6522869" y="4451485"/>
+                <a:off x="6522869" y="4217563"/>
                 <a:ext cx="612222" cy="307777"/>
               </a:xfrm>
               <a:prstGeom prst="rect">
@@ -17830,6 +17832,7 @@
               </a:bodyPr>
               <a:lstStyle/>
               <a:p>
+                <a:pPr/>
                 <a14:m>
                   <m:oMathPara xmlns:m="http://schemas.openxmlformats.org/officeDocument/2006/math">
                     <m:oMathParaPr>
@@ -17892,7 +17895,7 @@
             </p:nvSpPr>
             <p:spPr>
               <a:xfrm>
-                <a:off x="6522869" y="4451485"/>
+                <a:off x="6522869" y="4217563"/>
                 <a:ext cx="612222" cy="307777"/>
               </a:xfrm>
               <a:prstGeom prst="rect">
@@ -17901,7 +17904,7 @@
               <a:blipFill rotWithShape="0">
                 <a:blip r:embed="rId4"/>
                 <a:stretch>
-                  <a:fillRect l="-10000" r="-5000" b="-15686"/>
+                  <a:fillRect l="-10000" r="-5000" b="-16000"/>
                 </a:stretch>
               </a:blipFill>
             </p:spPr>
@@ -17930,7 +17933,7 @@
             </p:nvSpPr>
             <p:spPr>
               <a:xfrm>
-                <a:off x="5660948" y="4451485"/>
+                <a:off x="5660948" y="4217563"/>
                 <a:ext cx="612222" cy="307777"/>
               </a:xfrm>
               <a:prstGeom prst="rect">
@@ -17944,6 +17947,7 @@
               </a:bodyPr>
               <a:lstStyle/>
               <a:p>
+                <a:pPr/>
                 <a14:m>
                   <m:oMathPara xmlns:m="http://schemas.openxmlformats.org/officeDocument/2006/math">
                     <m:oMathParaPr>
@@ -18006,7 +18010,7 @@
             </p:nvSpPr>
             <p:spPr>
               <a:xfrm>
-                <a:off x="5660948" y="4451485"/>
+                <a:off x="5660948" y="4217563"/>
                 <a:ext cx="612222" cy="307777"/>
               </a:xfrm>
               <a:prstGeom prst="rect">
@@ -18015,7 +18019,7 @@
               <a:blipFill rotWithShape="0">
                 <a:blip r:embed="rId5"/>
                 <a:stretch>
-                  <a:fillRect l="-12000" r="-5000" b="-15686"/>
+                  <a:fillRect l="-12000" r="-5000" b="-16000"/>
                 </a:stretch>
               </a:blipFill>
             </p:spPr>
@@ -18044,7 +18048,7 @@
             </p:nvSpPr>
             <p:spPr>
               <a:xfrm>
-                <a:off x="8097880" y="4451484"/>
+                <a:off x="8097880" y="4217562"/>
                 <a:ext cx="612222" cy="307777"/>
               </a:xfrm>
               <a:prstGeom prst="rect">
@@ -18058,6 +18062,7 @@
               </a:bodyPr>
               <a:lstStyle/>
               <a:p>
+                <a:pPr/>
                 <a14:m>
                   <m:oMathPara xmlns:m="http://schemas.openxmlformats.org/officeDocument/2006/math">
                     <m:oMathParaPr>
@@ -18120,7 +18125,7 @@
             </p:nvSpPr>
             <p:spPr>
               <a:xfrm>
-                <a:off x="8097880" y="4451484"/>
+                <a:off x="8097880" y="4217562"/>
                 <a:ext cx="612222" cy="307777"/>
               </a:xfrm>
               <a:prstGeom prst="rect">
@@ -18129,7 +18134,7 @@
               <a:blipFill rotWithShape="0">
                 <a:blip r:embed="rId6"/>
                 <a:stretch>
-                  <a:fillRect l="-10891" r="-4950" b="-15686"/>
+                  <a:fillRect l="-10891" r="-4950" b="-16000"/>
                 </a:stretch>
               </a:blipFill>
             </p:spPr>
@@ -18172,6 +18177,7 @@
               </a:bodyPr>
               <a:lstStyle/>
               <a:p>
+                <a:pPr/>
                 <a14:m>
                   <m:oMathPara xmlns:m="http://schemas.openxmlformats.org/officeDocument/2006/math">
                     <m:oMathParaPr>
@@ -18272,7 +18278,7 @@
             </p:nvSpPr>
             <p:spPr>
               <a:xfrm>
-                <a:off x="6102113" y="5829836"/>
+                <a:off x="6102113" y="5298198"/>
                 <a:ext cx="612222" cy="307777"/>
               </a:xfrm>
               <a:prstGeom prst="rect">
@@ -18286,6 +18292,7 @@
               </a:bodyPr>
               <a:lstStyle/>
               <a:p>
+                <a:pPr/>
                 <a14:m>
                   <m:oMathPara xmlns:m="http://schemas.openxmlformats.org/officeDocument/2006/math">
                     <m:oMathParaPr>
@@ -18348,7 +18355,7 @@
             </p:nvSpPr>
             <p:spPr>
               <a:xfrm>
-                <a:off x="6102113" y="5829836"/>
+                <a:off x="6102113" y="5298198"/>
                 <a:ext cx="612222" cy="307777"/>
               </a:xfrm>
               <a:prstGeom prst="rect">

</xml_diff>